<commit_message>
Minor Update to Part 1 slides
</commit_message>
<xml_diff>
--- a/RWorkshopPart1-BasicObjects.pptx
+++ b/RWorkshopPart1-BasicObjects.pptx
@@ -263,7 +263,7 @@
           <a:p>
             <a:fld id="{538792E7-FD02-444D-98EB-904287DD5D64}" type="datetimeFigureOut">
               <a:rPr lang="en-US" smtClean="0"/>
-              <a:t>1/11/21</a:t>
+              <a:t>5/3/21</a:t>
             </a:fld>
             <a:endParaRPr lang="en-US"/>
           </a:p>
@@ -429,7 +429,7 @@
           <a:p>
             <a:fld id="{9D559F19-48A4-4320-AEB0-F8746EB4B46C}" type="datetimeFigureOut">
               <a:rPr lang="en-US" smtClean="0"/>
-              <a:t>1/11/21</a:t>
+              <a:t>5/3/21</a:t>
             </a:fld>
             <a:endParaRPr lang="en-US"/>
           </a:p>
@@ -876,7 +876,7 @@
           <a:p>
             <a:fld id="{B85D0F99-2B73-D44A-BFD7-568E87432832}" type="datetime1">
               <a:rPr lang="en-US" smtClean="0"/>
-              <a:t>1/11/21</a:t>
+              <a:t>5/3/21</a:t>
             </a:fld>
             <a:endParaRPr lang="en-US"/>
           </a:p>
@@ -1044,7 +1044,7 @@
           <a:p>
             <a:fld id="{08D84F97-D933-494A-8066-987F64E94EB0}" type="datetime1">
               <a:rPr lang="en-US" smtClean="0"/>
-              <a:t>1/11/21</a:t>
+              <a:t>5/3/21</a:t>
             </a:fld>
             <a:endParaRPr lang="en-US"/>
           </a:p>
@@ -1222,7 +1222,7 @@
           <a:p>
             <a:fld id="{43D4ED65-347A-544C-B252-FFB61369C75C}" type="datetime1">
               <a:rPr lang="en-US" smtClean="0"/>
-              <a:t>1/11/21</a:t>
+              <a:t>5/3/21</a:t>
             </a:fld>
             <a:endParaRPr lang="en-US"/>
           </a:p>
@@ -1390,7 +1390,7 @@
           <a:p>
             <a:fld id="{7580FBDC-27FE-2246-A6BD-27E29FC41690}" type="datetime1">
               <a:rPr lang="en-US" smtClean="0"/>
-              <a:t>1/11/21</a:t>
+              <a:t>5/3/21</a:t>
             </a:fld>
             <a:endParaRPr lang="en-US"/>
           </a:p>
@@ -1646,7 +1646,7 @@
           <a:p>
             <a:fld id="{A3085202-158B-1648-823E-AE57EB968243}" type="datetime1">
               <a:rPr lang="en-US" smtClean="0"/>
-              <a:t>1/11/21</a:t>
+              <a:t>5/3/21</a:t>
             </a:fld>
             <a:endParaRPr lang="en-US"/>
           </a:p>
@@ -1931,7 +1931,7 @@
           <a:p>
             <a:fld id="{26266243-15FF-1E48-B623-320FA07824B2}" type="datetime1">
               <a:rPr lang="en-US" smtClean="0"/>
-              <a:t>1/11/21</a:t>
+              <a:t>5/3/21</a:t>
             </a:fld>
             <a:endParaRPr lang="en-US"/>
           </a:p>
@@ -2350,7 +2350,7 @@
           <a:p>
             <a:fld id="{011E066B-8219-F64F-B8C2-53A3B89B4A85}" type="datetime1">
               <a:rPr lang="en-US" smtClean="0"/>
-              <a:t>1/11/21</a:t>
+              <a:t>5/3/21</a:t>
             </a:fld>
             <a:endParaRPr lang="en-US"/>
           </a:p>
@@ -2467,7 +2467,7 @@
           <a:p>
             <a:fld id="{A647D7BC-6ED1-5643-8901-5A74D745B5F6}" type="datetime1">
               <a:rPr lang="en-US" smtClean="0"/>
-              <a:t>1/11/21</a:t>
+              <a:t>5/3/21</a:t>
             </a:fld>
             <a:endParaRPr lang="en-US"/>
           </a:p>
@@ -2562,7 +2562,7 @@
           <a:p>
             <a:fld id="{9D749149-7531-A94B-BF64-9F90465D006E}" type="datetime1">
               <a:rPr lang="en-US" smtClean="0"/>
-              <a:t>1/11/21</a:t>
+              <a:t>5/3/21</a:t>
             </a:fld>
             <a:endParaRPr lang="en-US"/>
           </a:p>
@@ -2837,7 +2837,7 @@
           <a:p>
             <a:fld id="{3DCADEC6-74E3-5A45-956D-36673A0B0B6F}" type="datetime1">
               <a:rPr lang="en-US" smtClean="0"/>
-              <a:t>1/11/21</a:t>
+              <a:t>5/3/21</a:t>
             </a:fld>
             <a:endParaRPr lang="en-US"/>
           </a:p>
@@ -3089,7 +3089,7 @@
           <a:p>
             <a:fld id="{E8837371-C5DD-DB40-BAF9-B253BC12B671}" type="datetime1">
               <a:rPr lang="en-US" smtClean="0"/>
-              <a:t>1/11/21</a:t>
+              <a:t>5/3/21</a:t>
             </a:fld>
             <a:endParaRPr lang="en-US"/>
           </a:p>
@@ -3300,7 +3300,7 @@
           <a:p>
             <a:fld id="{61AE1620-0FA7-334D-A30B-254236132EE6}" type="datetime1">
               <a:rPr lang="en-US" smtClean="0"/>
-              <a:t>1/11/21</a:t>
+              <a:t>5/3/21</a:t>
             </a:fld>
             <a:endParaRPr lang="en-US"/>
           </a:p>
@@ -3729,7 +3729,7 @@
           <a:p>
             <a:r>
               <a:rPr lang="en-US" dirty="0"/>
-              <a:t>SER 2020 (in Jan 2021)</a:t>
+              <a:t>SER 2021 (in May 2021)</a:t>
             </a:r>
           </a:p>
         </p:txBody>
@@ -3766,7 +3766,7 @@
             </a:r>
             <a:r>
               <a:rPr lang="en-US" dirty="0"/>
-              <a:t>/smooney27/RWorkshopSER2020</a:t>
+              <a:t>/smooney27/RWorkshopSER2021</a:t>
             </a:r>
           </a:p>
         </p:txBody>
@@ -3829,14 +3829,14 @@
           </a:ln>
           <a:extLst>
             <a:ext uri="{909E8E84-426E-40dd-AFC4-6F175D3DCCD1}">
-              <a14:hiddenFill xmlns="" xmlns:a14="http://schemas.microsoft.com/office/drawing/2010/main">
+              <a14:hiddenFill xmlns:a14="http://schemas.microsoft.com/office/drawing/2010/main" xmlns="">
                 <a:solidFill>
                   <a:schemeClr val="accent1"/>
                 </a:solidFill>
               </a14:hiddenFill>
             </a:ext>
             <a:ext uri="{91240B29-F687-4f45-9708-019B960494DF}">
-              <a14:hiddenLine xmlns="" xmlns:a14="http://schemas.microsoft.com/office/drawing/2010/main" w="9525">
+              <a14:hiddenLine xmlns:a14="http://schemas.microsoft.com/office/drawing/2010/main" xmlns="" w="9525">
                 <a:solidFill>
                   <a:schemeClr val="tx1"/>
                 </a:solidFill>
@@ -3883,14 +3883,14 @@
           </a:ln>
           <a:extLst>
             <a:ext uri="{909E8E84-426E-40dd-AFC4-6F175D3DCCD1}">
-              <a14:hiddenFill xmlns="" xmlns:a14="http://schemas.microsoft.com/office/drawing/2010/main">
+              <a14:hiddenFill xmlns:a14="http://schemas.microsoft.com/office/drawing/2010/main" xmlns="">
                 <a:solidFill>
                   <a:schemeClr val="accent1"/>
                 </a:solidFill>
               </a14:hiddenFill>
             </a:ext>
             <a:ext uri="{91240B29-F687-4f45-9708-019B960494DF}">
-              <a14:hiddenLine xmlns="" xmlns:a14="http://schemas.microsoft.com/office/drawing/2010/main" w="9525">
+              <a14:hiddenLine xmlns:a14="http://schemas.microsoft.com/office/drawing/2010/main" xmlns="" w="9525">
                 <a:solidFill>
                   <a:schemeClr val="tx1"/>
                 </a:solidFill>
@@ -4177,7 +4177,7 @@
             </a:r>
             <a:r>
               <a:rPr lang="en-US" dirty="0"/>
-              <a:t>/smooney27/RWorkshopSER2020</a:t>
+              <a:t>/smooney27/RWorkshopSER2021</a:t>
             </a:r>
           </a:p>
         </p:txBody>
@@ -4340,7 +4340,7 @@
             </a:r>
             <a:r>
               <a:rPr lang="en-US" dirty="0"/>
-              <a:t>/smooney27/RWorkshopSER2020</a:t>
+              <a:t>/smooney27/RWorkshopSER2021</a:t>
             </a:r>
           </a:p>
         </p:txBody>
@@ -4587,7 +4587,7 @@
             </a:r>
             <a:r>
               <a:rPr lang="en-US" dirty="0"/>
-              <a:t>/smooney27/RWorkshopSER2020</a:t>
+              <a:t>/smooney27/RWorkshopSER2021</a:t>
             </a:r>
           </a:p>
         </p:txBody>
@@ -4721,14 +4721,14 @@
           <a:effectLst/>
           <a:extLst>
             <a:ext uri="{909E8E84-426E-40dd-AFC4-6F175D3DCCD1}">
-              <a14:hiddenFill xmlns="" xmlns:a14="http://schemas.microsoft.com/office/drawing/2010/main">
+              <a14:hiddenFill xmlns:a14="http://schemas.microsoft.com/office/drawing/2010/main" xmlns="">
                 <a:solidFill>
                   <a:schemeClr val="accent1"/>
                 </a:solidFill>
               </a14:hiddenFill>
             </a:ext>
             <a:ext uri="{91240B29-F687-4f45-9708-019B960494DF}">
-              <a14:hiddenLine xmlns="" xmlns:a14="http://schemas.microsoft.com/office/drawing/2010/main" w="9525">
+              <a14:hiddenLine xmlns:a14="http://schemas.microsoft.com/office/drawing/2010/main" xmlns="" w="9525">
                 <a:solidFill>
                   <a:schemeClr val="tx1"/>
                 </a:solidFill>
@@ -4738,7 +4738,7 @@
               </a14:hiddenLine>
             </a:ext>
             <a:ext uri="{AF507438-7753-43e0-B8FC-AC1667EBCBE1}">
-              <a14:hiddenEffects xmlns="" xmlns:a14="http://schemas.microsoft.com/office/drawing/2010/main">
+              <a14:hiddenEffects xmlns:a14="http://schemas.microsoft.com/office/drawing/2010/main" xmlns="">
                 <a:effectLst>
                   <a:outerShdw dist="35921" dir="2700000" algn="ctr" rotWithShape="0">
                     <a:schemeClr val="bg2"/>
@@ -4804,7 +4804,7 @@
             </a:r>
             <a:r>
               <a:rPr lang="en-US" dirty="0"/>
-              <a:t>/smooney27/RWorkshopSER2020</a:t>
+              <a:t>/smooney27/RWorkshopSER2021</a:t>
             </a:r>
           </a:p>
         </p:txBody>
@@ -4993,14 +4993,14 @@
           </a:ln>
           <a:extLst>
             <a:ext uri="{909E8E84-426E-40dd-AFC4-6F175D3DCCD1}">
-              <a14:hiddenFill xmlns="" xmlns:a14="http://schemas.microsoft.com/office/drawing/2010/main">
+              <a14:hiddenFill xmlns:a14="http://schemas.microsoft.com/office/drawing/2010/main" xmlns="">
                 <a:solidFill>
                   <a:schemeClr val="accent1"/>
                 </a:solidFill>
               </a14:hiddenFill>
             </a:ext>
             <a:ext uri="{91240B29-F687-4f45-9708-019B960494DF}">
-              <a14:hiddenLine xmlns="" xmlns:a14="http://schemas.microsoft.com/office/drawing/2010/main" w="9525">
+              <a14:hiddenLine xmlns:a14="http://schemas.microsoft.com/office/drawing/2010/main" xmlns="" w="9525">
                 <a:solidFill>
                   <a:schemeClr val="tx1"/>
                 </a:solidFill>
@@ -5095,7 +5095,7 @@
             </a:r>
             <a:r>
               <a:rPr lang="en-US" dirty="0"/>
-              <a:t>/smooney27/RWorkshopSER2020</a:t>
+              <a:t>/smooney27/RWorkshopSER2021</a:t>
             </a:r>
           </a:p>
         </p:txBody>
@@ -5339,14 +5339,14 @@
           <a:effectLst/>
           <a:extLst>
             <a:ext uri="{909E8E84-426E-40dd-AFC4-6F175D3DCCD1}">
-              <a14:hiddenFill xmlns="" xmlns:a14="http://schemas.microsoft.com/office/drawing/2010/main">
+              <a14:hiddenFill xmlns:a14="http://schemas.microsoft.com/office/drawing/2010/main" xmlns="">
                 <a:solidFill>
                   <a:schemeClr val="accent1"/>
                 </a:solidFill>
               </a14:hiddenFill>
             </a:ext>
             <a:ext uri="{91240B29-F687-4f45-9708-019B960494DF}">
-              <a14:hiddenLine xmlns="" xmlns:a14="http://schemas.microsoft.com/office/drawing/2010/main" w="9525">
+              <a14:hiddenLine xmlns:a14="http://schemas.microsoft.com/office/drawing/2010/main" xmlns="" w="9525">
                 <a:solidFill>
                   <a:schemeClr val="tx1"/>
                 </a:solidFill>
@@ -5356,7 +5356,7 @@
               </a14:hiddenLine>
             </a:ext>
             <a:ext uri="{AF507438-7753-43e0-B8FC-AC1667EBCBE1}">
-              <a14:hiddenEffects xmlns="" xmlns:a14="http://schemas.microsoft.com/office/drawing/2010/main">
+              <a14:hiddenEffects xmlns:a14="http://schemas.microsoft.com/office/drawing/2010/main" xmlns="">
                 <a:effectLst>
                   <a:outerShdw dist="35921" dir="2700000" algn="ctr" rotWithShape="0">
                     <a:schemeClr val="bg2"/>
@@ -5422,7 +5422,7 @@
             </a:r>
             <a:r>
               <a:rPr lang="en-US" dirty="0"/>
-              <a:t>/smooney27/RWorkshopSER2020</a:t>
+              <a:t>/smooney27/RWorkshopSER2021</a:t>
             </a:r>
           </a:p>
         </p:txBody>
@@ -6091,7 +6091,7 @@
             </a:r>
             <a:r>
               <a:rPr lang="en-US" dirty="0"/>
-              <a:t>/smooney27/RWorkshopSER2020</a:t>
+              <a:t>/smooney27/RWorkshopSER2021</a:t>
             </a:r>
           </a:p>
         </p:txBody>
@@ -6310,7 +6310,7 @@
             </a:r>
             <a:r>
               <a:rPr lang="en-US" dirty="0"/>
-              <a:t>/smooney27/RWorkshopSER2020</a:t>
+              <a:t>/smooney27/RWorkshopSER2021</a:t>
             </a:r>
           </a:p>
         </p:txBody>
@@ -6512,7 +6512,7 @@
             </a:r>
             <a:r>
               <a:rPr lang="en-US" dirty="0"/>
-              <a:t>/smooney27/RWorkshopSER2020</a:t>
+              <a:t>/smooney27/RWorkshopSER2021</a:t>
             </a:r>
           </a:p>
         </p:txBody>
@@ -6744,7 +6744,7 @@
             </a:r>
             <a:r>
               <a:rPr lang="en-US" dirty="0"/>
-              <a:t>/smooney27/RWorkshopSER2020</a:t>
+              <a:t>/smooney27/RWorkshopSER2021</a:t>
             </a:r>
           </a:p>
         </p:txBody>
@@ -6898,7 +6898,7 @@
             </a:r>
             <a:r>
               <a:rPr lang="en-US" dirty="0"/>
-              <a:t>/smooney27/RWorkshopSER2020</a:t>
+              <a:t>/smooney27/RWorkshopSER2021</a:t>
             </a:r>
           </a:p>
         </p:txBody>
@@ -7063,14 +7063,14 @@
           <a:effectLst/>
           <a:extLst>
             <a:ext uri="{909E8E84-426E-40dd-AFC4-6F175D3DCCD1}">
-              <a14:hiddenFill xmlns="" xmlns:a14="http://schemas.microsoft.com/office/drawing/2010/main">
+              <a14:hiddenFill xmlns:a14="http://schemas.microsoft.com/office/drawing/2010/main" xmlns="">
                 <a:solidFill>
                   <a:schemeClr val="accent1"/>
                 </a:solidFill>
               </a14:hiddenFill>
             </a:ext>
             <a:ext uri="{91240B29-F687-4f45-9708-019B960494DF}">
-              <a14:hiddenLine xmlns="" xmlns:a14="http://schemas.microsoft.com/office/drawing/2010/main" w="9525">
+              <a14:hiddenLine xmlns:a14="http://schemas.microsoft.com/office/drawing/2010/main" xmlns="" w="9525">
                 <a:solidFill>
                   <a:schemeClr val="tx1"/>
                 </a:solidFill>
@@ -7080,7 +7080,7 @@
               </a14:hiddenLine>
             </a:ext>
             <a:ext uri="{AF507438-7753-43e0-B8FC-AC1667EBCBE1}">
-              <a14:hiddenEffects xmlns="" xmlns:a14="http://schemas.microsoft.com/office/drawing/2010/main">
+              <a14:hiddenEffects xmlns:a14="http://schemas.microsoft.com/office/drawing/2010/main" xmlns="">
                 <a:effectLst>
                   <a:outerShdw dist="35921" dir="2700000" algn="ctr" rotWithShape="0">
                     <a:schemeClr val="bg2"/>
@@ -7146,7 +7146,7 @@
             </a:r>
             <a:r>
               <a:rPr lang="en-US" dirty="0"/>
-              <a:t>/smooney27/RWorkshopSER2020</a:t>
+              <a:t>/smooney27/RWorkshopSER2021</a:t>
             </a:r>
           </a:p>
         </p:txBody>
@@ -8133,7 +8133,7 @@
             </a:r>
             <a:r>
               <a:rPr lang="en-US" dirty="0"/>
-              <a:t>/smooney27/RWorkshopSER2020</a:t>
+              <a:t>/smooney27/RWorkshopSER2021</a:t>
             </a:r>
           </a:p>
         </p:txBody>
@@ -8320,7 +8320,7 @@
             </a:r>
             <a:r>
               <a:rPr lang="en-US" dirty="0"/>
-              <a:t>/smooney27/RWorkshopSER2020</a:t>
+              <a:t>/smooney27/RWorkshopSER2021</a:t>
             </a:r>
           </a:p>
         </p:txBody>
@@ -8652,7 +8652,7 @@
             </a:r>
             <a:r>
               <a:rPr lang="en-US" dirty="0"/>
-              <a:t>/smooney27/RWorkshopSER2020</a:t>
+              <a:t>/smooney27/RWorkshopSER2021</a:t>
             </a:r>
           </a:p>
         </p:txBody>
@@ -8906,7 +8906,7 @@
             </a:r>
             <a:r>
               <a:rPr lang="en-US" dirty="0"/>
-              <a:t>/smooney27/RWorkshopSER2020</a:t>
+              <a:t>/smooney27/RWorkshopSER2021</a:t>
             </a:r>
           </a:p>
         </p:txBody>
@@ -9025,7 +9025,7 @@
             </a:r>
             <a:r>
               <a:rPr lang="en-US" sz="2400" dirty="0"/>
-              <a:t>/smooney27/RWorkshopSER2020</a:t>
+              <a:t>/smooney27/RWorkshopSER2021</a:t>
             </a:r>
           </a:p>
         </p:txBody>
@@ -10089,7 +10089,7 @@
             </a:r>
             <a:r>
               <a:rPr lang="en-US" dirty="0"/>
-              <a:t>/smooney27/RWorkshopSER2020</a:t>
+              <a:t>/smooney27/RWorkshopSER2021</a:t>
             </a:r>
           </a:p>
         </p:txBody>
@@ -10710,14 +10710,14 @@
           <a:effectLst/>
           <a:extLst>
             <a:ext uri="{909E8E84-426E-40dd-AFC4-6F175D3DCCD1}">
-              <a14:hiddenFill xmlns="" xmlns:a14="http://schemas.microsoft.com/office/drawing/2010/main">
+              <a14:hiddenFill xmlns:a14="http://schemas.microsoft.com/office/drawing/2010/main" xmlns="">
                 <a:solidFill>
                   <a:schemeClr val="accent1"/>
                 </a:solidFill>
               </a14:hiddenFill>
             </a:ext>
             <a:ext uri="{91240B29-F687-4f45-9708-019B960494DF}">
-              <a14:hiddenLine xmlns="" xmlns:a14="http://schemas.microsoft.com/office/drawing/2010/main" w="9525">
+              <a14:hiddenLine xmlns:a14="http://schemas.microsoft.com/office/drawing/2010/main" xmlns="" w="9525">
                 <a:solidFill>
                   <a:schemeClr val="tx1"/>
                 </a:solidFill>
@@ -10727,7 +10727,7 @@
               </a14:hiddenLine>
             </a:ext>
             <a:ext uri="{AF507438-7753-43e0-B8FC-AC1667EBCBE1}">
-              <a14:hiddenEffects xmlns="" xmlns:a14="http://schemas.microsoft.com/office/drawing/2010/main">
+              <a14:hiddenEffects xmlns:a14="http://schemas.microsoft.com/office/drawing/2010/main" xmlns="">
                 <a:effectLst>
                   <a:outerShdw dist="35921" dir="2700000" algn="ctr" rotWithShape="0">
                     <a:schemeClr val="bg2"/>
@@ -11294,14 +11294,14 @@
           <a:effectLst/>
           <a:extLst>
             <a:ext uri="{909E8E84-426E-40dd-AFC4-6F175D3DCCD1}">
-              <a14:hiddenFill xmlns="" xmlns:a14="http://schemas.microsoft.com/office/drawing/2010/main">
+              <a14:hiddenFill xmlns:a14="http://schemas.microsoft.com/office/drawing/2010/main" xmlns="">
                 <a:solidFill>
                   <a:schemeClr val="accent1"/>
                 </a:solidFill>
               </a14:hiddenFill>
             </a:ext>
             <a:ext uri="{91240B29-F687-4f45-9708-019B960494DF}">
-              <a14:hiddenLine xmlns="" xmlns:a14="http://schemas.microsoft.com/office/drawing/2010/main" w="9525">
+              <a14:hiddenLine xmlns:a14="http://schemas.microsoft.com/office/drawing/2010/main" xmlns="" w="9525">
                 <a:solidFill>
                   <a:schemeClr val="tx1"/>
                 </a:solidFill>
@@ -11311,7 +11311,7 @@
               </a14:hiddenLine>
             </a:ext>
             <a:ext uri="{AF507438-7753-43e0-B8FC-AC1667EBCBE1}">
-              <a14:hiddenEffects xmlns="" xmlns:a14="http://schemas.microsoft.com/office/drawing/2010/main">
+              <a14:hiddenEffects xmlns:a14="http://schemas.microsoft.com/office/drawing/2010/main" xmlns="">
                 <a:effectLst>
                   <a:outerShdw dist="35921" dir="2700000" algn="ctr" rotWithShape="0">
                     <a:schemeClr val="bg2"/>
@@ -11706,14 +11706,14 @@
           <a:effectLst/>
           <a:extLst>
             <a:ext uri="{909E8E84-426E-40dd-AFC4-6F175D3DCCD1}">
-              <a14:hiddenFill xmlns="" xmlns:a14="http://schemas.microsoft.com/office/drawing/2010/main">
+              <a14:hiddenFill xmlns:a14="http://schemas.microsoft.com/office/drawing/2010/main" xmlns="">
                 <a:solidFill>
                   <a:schemeClr val="accent1"/>
                 </a:solidFill>
               </a14:hiddenFill>
             </a:ext>
             <a:ext uri="{91240B29-F687-4f45-9708-019B960494DF}">
-              <a14:hiddenLine xmlns="" xmlns:a14="http://schemas.microsoft.com/office/drawing/2010/main" w="9525">
+              <a14:hiddenLine xmlns:a14="http://schemas.microsoft.com/office/drawing/2010/main" xmlns="" w="9525">
                 <a:solidFill>
                   <a:schemeClr val="tx1"/>
                 </a:solidFill>
@@ -11723,7 +11723,7 @@
               </a14:hiddenLine>
             </a:ext>
             <a:ext uri="{AF507438-7753-43e0-B8FC-AC1667EBCBE1}">
-              <a14:hiddenEffects xmlns="" xmlns:a14="http://schemas.microsoft.com/office/drawing/2010/main">
+              <a14:hiddenEffects xmlns:a14="http://schemas.microsoft.com/office/drawing/2010/main" xmlns="">
                 <a:effectLst>
                   <a:outerShdw dist="35921" dir="2700000" algn="ctr" rotWithShape="0">
                     <a:schemeClr val="bg2"/>
@@ -12142,14 +12142,14 @@
           <a:effectLst/>
           <a:extLst>
             <a:ext uri="{909E8E84-426E-40dd-AFC4-6F175D3DCCD1}">
-              <a14:hiddenFill xmlns="" xmlns:a14="http://schemas.microsoft.com/office/drawing/2010/main">
+              <a14:hiddenFill xmlns:a14="http://schemas.microsoft.com/office/drawing/2010/main" xmlns="">
                 <a:solidFill>
                   <a:schemeClr val="accent1"/>
                 </a:solidFill>
               </a14:hiddenFill>
             </a:ext>
             <a:ext uri="{91240B29-F687-4f45-9708-019B960494DF}">
-              <a14:hiddenLine xmlns="" xmlns:a14="http://schemas.microsoft.com/office/drawing/2010/main" w="9525">
+              <a14:hiddenLine xmlns:a14="http://schemas.microsoft.com/office/drawing/2010/main" xmlns="" w="9525">
                 <a:solidFill>
                   <a:schemeClr val="tx1"/>
                 </a:solidFill>
@@ -12159,7 +12159,7 @@
               </a14:hiddenLine>
             </a:ext>
             <a:ext uri="{AF507438-7753-43e0-B8FC-AC1667EBCBE1}">
-              <a14:hiddenEffects xmlns="" xmlns:a14="http://schemas.microsoft.com/office/drawing/2010/main">
+              <a14:hiddenEffects xmlns:a14="http://schemas.microsoft.com/office/drawing/2010/main" xmlns="">
                 <a:effectLst>
                   <a:outerShdw dist="35921" dir="2700000" algn="ctr" rotWithShape="0">
                     <a:schemeClr val="bg2"/>
@@ -12373,7 +12373,7 @@
             </a:r>
             <a:r>
               <a:rPr lang="en-US" dirty="0"/>
-              <a:t>/smooney27/RWorkshopSER2020</a:t>
+              <a:t>/smooney27/RWorkshopSER2021</a:t>
             </a:r>
           </a:p>
         </p:txBody>
@@ -12834,14 +12834,14 @@
           <a:effectLst/>
           <a:extLst>
             <a:ext uri="{909E8E84-426E-40dd-AFC4-6F175D3DCCD1}">
-              <a14:hiddenFill xmlns="" xmlns:a14="http://schemas.microsoft.com/office/drawing/2010/main">
+              <a14:hiddenFill xmlns:a14="http://schemas.microsoft.com/office/drawing/2010/main" xmlns="">
                 <a:solidFill>
                   <a:schemeClr val="accent1"/>
                 </a:solidFill>
               </a14:hiddenFill>
             </a:ext>
             <a:ext uri="{91240B29-F687-4f45-9708-019B960494DF}">
-              <a14:hiddenLine xmlns="" xmlns:a14="http://schemas.microsoft.com/office/drawing/2010/main" w="9525">
+              <a14:hiddenLine xmlns:a14="http://schemas.microsoft.com/office/drawing/2010/main" xmlns="" w="9525">
                 <a:solidFill>
                   <a:schemeClr val="tx1"/>
                 </a:solidFill>
@@ -12851,7 +12851,7 @@
               </a14:hiddenLine>
             </a:ext>
             <a:ext uri="{AF507438-7753-43e0-B8FC-AC1667EBCBE1}">
-              <a14:hiddenEffects xmlns="" xmlns:a14="http://schemas.microsoft.com/office/drawing/2010/main">
+              <a14:hiddenEffects xmlns:a14="http://schemas.microsoft.com/office/drawing/2010/main" xmlns="">
                 <a:effectLst>
                   <a:outerShdw dist="35921" dir="2700000" algn="ctr" rotWithShape="0">
                     <a:schemeClr val="bg2"/>
@@ -14377,14 +14377,14 @@
           <a:effectLst/>
           <a:extLst>
             <a:ext uri="{909E8E84-426E-40dd-AFC4-6F175D3DCCD1}">
-              <a14:hiddenFill xmlns="" xmlns:a14="http://schemas.microsoft.com/office/drawing/2010/main">
+              <a14:hiddenFill xmlns:a14="http://schemas.microsoft.com/office/drawing/2010/main" xmlns="">
                 <a:solidFill>
                   <a:schemeClr val="accent1"/>
                 </a:solidFill>
               </a14:hiddenFill>
             </a:ext>
             <a:ext uri="{91240B29-F687-4f45-9708-019B960494DF}">
-              <a14:hiddenLine xmlns="" xmlns:a14="http://schemas.microsoft.com/office/drawing/2010/main" w="9525">
+              <a14:hiddenLine xmlns:a14="http://schemas.microsoft.com/office/drawing/2010/main" xmlns="" w="9525">
                 <a:solidFill>
                   <a:schemeClr val="tx1"/>
                 </a:solidFill>
@@ -14394,7 +14394,7 @@
               </a14:hiddenLine>
             </a:ext>
             <a:ext uri="{AF507438-7753-43e0-B8FC-AC1667EBCBE1}">
-              <a14:hiddenEffects xmlns="" xmlns:a14="http://schemas.microsoft.com/office/drawing/2010/main">
+              <a14:hiddenEffects xmlns:a14="http://schemas.microsoft.com/office/drawing/2010/main" xmlns="">
                 <a:effectLst>
                   <a:outerShdw dist="35921" dir="2700000" algn="ctr" rotWithShape="0">
                     <a:schemeClr val="bg2"/>
@@ -14787,7 +14787,7 @@
             </a:r>
             <a:r>
               <a:rPr lang="en-US" dirty="0"/>
-              <a:t>/smooney27/RWorkshopSER2020</a:t>
+              <a:t>/smooney27/RWorkshopSER2021</a:t>
             </a:r>
           </a:p>
         </p:txBody>
@@ -15544,7 +15544,7 @@
             </a:r>
             <a:r>
               <a:rPr lang="en-US" dirty="0"/>
-              <a:t>/smooney27/RWorkshopSER2020</a:t>
+              <a:t>/smooney27/RWorkshopSER2021</a:t>
             </a:r>
           </a:p>
         </p:txBody>
@@ -15713,7 +15713,7 @@
             </a:r>
             <a:r>
               <a:rPr lang="en-US" dirty="0"/>
-              <a:t>/smooney27/RWorkshopSER2020</a:t>
+              <a:t>/smooney27/RWorkshopSER2021</a:t>
             </a:r>
           </a:p>
         </p:txBody>
@@ -15878,14 +15878,14 @@
           <a:effectLst/>
           <a:extLst>
             <a:ext uri="{909E8E84-426E-40dd-AFC4-6F175D3DCCD1}">
-              <a14:hiddenFill xmlns="" xmlns:a14="http://schemas.microsoft.com/office/drawing/2010/main">
+              <a14:hiddenFill xmlns:a14="http://schemas.microsoft.com/office/drawing/2010/main" xmlns="">
                 <a:solidFill>
                   <a:schemeClr val="accent1"/>
                 </a:solidFill>
               </a14:hiddenFill>
             </a:ext>
             <a:ext uri="{91240B29-F687-4f45-9708-019B960494DF}">
-              <a14:hiddenLine xmlns="" xmlns:a14="http://schemas.microsoft.com/office/drawing/2010/main" w="9525">
+              <a14:hiddenLine xmlns:a14="http://schemas.microsoft.com/office/drawing/2010/main" xmlns="" w="9525">
                 <a:solidFill>
                   <a:schemeClr val="tx1"/>
                 </a:solidFill>
@@ -15895,7 +15895,7 @@
               </a14:hiddenLine>
             </a:ext>
             <a:ext uri="{AF507438-7753-43e0-B8FC-AC1667EBCBE1}">
-              <a14:hiddenEffects xmlns="" xmlns:a14="http://schemas.microsoft.com/office/drawing/2010/main">
+              <a14:hiddenEffects xmlns:a14="http://schemas.microsoft.com/office/drawing/2010/main" xmlns="">
                 <a:effectLst>
                   <a:outerShdw dist="35921" dir="2700000" algn="ctr" rotWithShape="0">
                     <a:schemeClr val="bg2"/>
@@ -15990,7 +15990,7 @@
             </a:r>
             <a:r>
               <a:rPr lang="en-US" dirty="0"/>
-              <a:t>/smooney27/RWorkshopSER2020</a:t>
+              <a:t>/smooney27/RWorkshopSER2021</a:t>
             </a:r>
           </a:p>
         </p:txBody>
@@ -16506,7 +16506,7 @@
             </a:r>
             <a:r>
               <a:rPr lang="en-US" dirty="0"/>
-              <a:t>/smooney27/RWorkshopSER2020</a:t>
+              <a:t>/smooney27/RWorkshopSER2021</a:t>
             </a:r>
           </a:p>
         </p:txBody>

</xml_diff>